<commit_message>
Minor fixes for encapsulation basics
</commit_message>
<xml_diff>
--- a/Courses/Software-Sciences/Module-1-OOP/08.1-Encapsulation-Basics/08.1-Encapsulation-Basics.pptx
+++ b/Courses/Software-Sciences/Module-1-OOP/08.1-Encapsulation-Basics/08.1-Encapsulation-Basics.pptx
@@ -305,7 +305,7 @@
           <a:p>
             <a:fld id="{4E087215-0C8F-4762-A664-737A353EC9A4}" type="datetimeFigureOut">
               <a:rPr lang="bg-BG" smtClean="0"/>
-              <a:t>21.01.23 г.</a:t>
+              <a:t>17.05.23 г.</a:t>
             </a:fld>
             <a:endParaRPr lang="bg-BG" dirty="0"/>
           </a:p>
@@ -496,7 +496,7 @@
           <a:p>
             <a:fld id="{72D84649-876A-46C9-8472-14CB09C070D8}" type="datetimeFigureOut">
               <a:rPr lang="en-US" smtClean="0"/>
-              <a:t>1/21/23</a:t>
+              <a:t>5/17/23</a:t>
             </a:fld>
             <a:endParaRPr lang="en-US" dirty="0"/>
           </a:p>
@@ -1054,7 +1054,7 @@
           <a:bodyPr/>
           <a:lstStyle/>
           <a:p>
-            <a:endParaRPr lang="en-BG" dirty="0"/>
+            <a:endParaRPr lang="en-BG"/>
           </a:p>
         </p:txBody>
       </p:sp>
@@ -1097,20 +1097,19 @@
           <a:lstStyle/>
           <a:p>
             <a:r>
-              <a:rPr lang="en-US"/>
+              <a:rPr lang="en-US" dirty="0"/>
               <a:t>© SoftUni – </a:t>
             </a:r>
             <a:r>
-              <a:rPr lang="en-US" u="sng">
+              <a:rPr lang="en-US" u="sng" dirty="0">
                 <a:hlinkClick r:id="rId3"/>
               </a:rPr>
               <a:t>https://softuni.org</a:t>
             </a:r>
             <a:r>
-              <a:rPr lang="en-US"/>
+              <a:rPr lang="en-US" dirty="0"/>
               <a:t>. Copyrighted document. Unauthorized copy or reproduction is not permitted.</a:t>
             </a:r>
-            <a:endParaRPr lang="en-US" dirty="0"/>
           </a:p>
         </p:txBody>
       </p:sp>
@@ -1230,7 +1229,7 @@
           <a:bodyPr/>
           <a:lstStyle/>
           <a:p>
-            <a:endParaRPr lang="bg-BG"/>
+            <a:endParaRPr lang="bg-BG" dirty="0"/>
           </a:p>
         </p:txBody>
       </p:sp>
@@ -1341,7 +1340,7 @@
           <a:bodyPr/>
           <a:lstStyle/>
           <a:p>
-            <a:endParaRPr lang="en-BG" dirty="0"/>
+            <a:endParaRPr lang="en-BG"/>
           </a:p>
         </p:txBody>
       </p:sp>
@@ -1384,20 +1383,19 @@
           <a:lstStyle/>
           <a:p>
             <a:r>
-              <a:rPr lang="en-US"/>
+              <a:rPr lang="en-US" dirty="0"/>
               <a:t>© SoftUni – </a:t>
             </a:r>
             <a:r>
-              <a:rPr lang="en-US" u="sng">
+              <a:rPr lang="en-US" u="sng" dirty="0">
                 <a:hlinkClick r:id="rId3"/>
               </a:rPr>
               <a:t>https://softuni.org</a:t>
             </a:r>
             <a:r>
-              <a:rPr lang="en-US"/>
+              <a:rPr lang="en-US" dirty="0"/>
               <a:t>. Copyrighted document. Unauthorized copy or reproduction is not permitted.</a:t>
             </a:r>
-            <a:endParaRPr lang="en-US" dirty="0"/>
           </a:p>
         </p:txBody>
       </p:sp>
@@ -1517,7 +1515,7 @@
           <a:bodyPr/>
           <a:lstStyle/>
           <a:p>
-            <a:endParaRPr lang="bg-BG"/>
+            <a:endParaRPr lang="bg-BG" dirty="0"/>
           </a:p>
         </p:txBody>
       </p:sp>
@@ -10464,11 +10462,7 @@
             </a:pPr>
             <a:r>
               <a:rPr lang="bg-BG" dirty="0"/>
-              <a:t>Ползи от </a:t>
-            </a:r>
-            <a:r>
-              <a:rPr lang="bg-BG" dirty="0" err="1"/>
-              <a:t>енкапсулацията</a:t>
+              <a:t>Ползи от енкапсулацията</a:t>
             </a:r>
             <a:endParaRPr lang="en-US" sz="3000" dirty="0"/>
           </a:p>
@@ -11237,7 +11231,7 @@
               <a:t> (</a:t>
             </a:r>
             <a:r>
-              <a:rPr lang="bg-BG" sz="2800" b="1" dirty="0" err="1"/>
+              <a:rPr lang="bg-BG" sz="2800" b="1" dirty="0"/>
               <a:t>стрингосване</a:t>
             </a:r>
             <a:r>
@@ -11250,16 +11244,6 @@
             <a:r>
               <a:rPr lang="bg-BG" sz="2800" dirty="0"/>
               <a:t> За тази цел пренаписваме метода </a:t>
-            </a:r>
-            <a:r>
-              <a:rPr lang="en-US" sz="2800" b="1" dirty="0" err="1">
-                <a:solidFill>
-                  <a:schemeClr val="bg1"/>
-                </a:solidFill>
-                <a:latin typeface="Consolas" panose="020B0609020204030204" pitchFamily="49" charset="0"/>
-                <a:cs typeface="Consolas" panose="020B0609020204030204" pitchFamily="49" charset="0"/>
-              </a:rPr>
-              <a:t>ToString</a:t>
             </a:r>
             <a:r>
               <a:rPr lang="en-US" sz="2800" b="1" dirty="0">
@@ -11269,7 +11253,7 @@
                 <a:latin typeface="Consolas" panose="020B0609020204030204" pitchFamily="49" charset="0"/>
                 <a:cs typeface="Consolas" panose="020B0609020204030204" pitchFamily="49" charset="0"/>
               </a:rPr>
-              <a:t>()</a:t>
+              <a:t>ToString()</a:t>
             </a:r>
             <a:r>
               <a:rPr lang="bg-BG" sz="2800" dirty="0"/>
@@ -11314,12 +11298,8 @@
               <a:t>Метод </a:t>
             </a:r>
             <a:r>
-              <a:rPr lang="en-US" dirty="0" err="1"/>
-              <a:t>ToString</a:t>
-            </a:r>
-            <a:r>
               <a:rPr lang="en-US" dirty="0"/>
-              <a:t>()</a:t>
+              <a:t>ToString()</a:t>
             </a:r>
           </a:p>
         </p:txBody>
@@ -11499,15 +11479,7 @@
             </a:r>
             <a:r>
               <a:rPr lang="en-US" sz="2400" dirty="0"/>
-              <a:t>{FirstName} {</a:t>
-            </a:r>
-            <a:r>
-              <a:rPr lang="en-US" sz="2400" dirty="0" err="1"/>
-              <a:t>LastName</a:t>
-            </a:r>
-            <a:r>
-              <a:rPr lang="en-US" sz="2400" dirty="0"/>
-              <a:t>}.</a:t>
+              <a:t>{FirstName} {LastName}.</a:t>
             </a:r>
             <a:r>
               <a:rPr lang="en-GB" sz="2400" dirty="0"/>
@@ -12908,7 +12880,7 @@
               <a:rPr lang="en-US" dirty="0">
                 <a:hlinkClick r:id="rId2"/>
               </a:rPr>
-              <a:t>https://judge.softuni.bg/Contests/Practice/Index/3163#1</a:t>
+              <a:t>https://judge.softuni.org/Contests/Practice/Index/4062#1</a:t>
             </a:r>
             <a:endParaRPr lang="en-US" dirty="0"/>
           </a:p>
@@ -15401,7 +15373,7 @@
           <a:p>
             <a:r>
               <a:rPr lang="bg-BG" sz="3799" dirty="0"/>
-              <a:t>Хвърляне на изключения - пример</a:t>
+              <a:t>Пример: Хвърляне на изключения</a:t>
             </a:r>
           </a:p>
         </p:txBody>
@@ -19210,7 +19182,7 @@
               <a:rPr lang="en-US" dirty="0">
                 <a:hlinkClick r:id="rId2"/>
               </a:rPr>
-              <a:t>https://judge.softuni.bg/Contests/Practice/Index/3163#2</a:t>
+              <a:t>https://judge.softuni.org/Contests/Practice/Index/4062#2</a:t>
             </a:r>
             <a:endParaRPr lang="en-US" dirty="0"/>
           </a:p>
@@ -22276,15 +22248,7 @@
           <a:p>
             <a:r>
               <a:rPr lang="bg-BG" dirty="0"/>
-              <a:t>Енкапсулация</a:t>
-            </a:r>
-            <a:r>
-              <a:rPr lang="en-US" dirty="0"/>
-              <a:t> – </a:t>
-            </a:r>
-            <a:r>
-              <a:rPr lang="bg-BG" dirty="0"/>
-              <a:t>пример</a:t>
+              <a:t>Пример: Енкапсулация</a:t>
             </a:r>
           </a:p>
         </p:txBody>

</xml_diff>

<commit_message>
bug fixes and improvements
</commit_message>
<xml_diff>
--- a/Courses/Software-Sciences/Module-1-OOP/08.1-Encapsulation-Basics/08.1-Encapsulation-Basics.pptx
+++ b/Courses/Software-Sciences/Module-1-OOP/08.1-Encapsulation-Basics/08.1-Encapsulation-Basics.pptx
@@ -144,7 +144,7 @@
             <p14:sldId id="292"/>
           </p14:sldIdLst>
         </p14:section>
-        <p14:section name="Какво е енкапсулация?" id="{B8F32016-7431-4DE3-B21E-2ABFDA04702D}">
+        <p14:section name="Какво е капсулация?" id="{B8F32016-7431-4DE3-B21E-2ABFDA04702D}">
           <p14:sldIdLst>
             <p14:sldId id="294"/>
             <p14:sldId id="295"/>
@@ -305,7 +305,7 @@
           <a:p>
             <a:fld id="{4E087215-0C8F-4762-A664-737A353EC9A4}" type="datetimeFigureOut">
               <a:rPr lang="bg-BG" smtClean="0"/>
-              <a:t>17.05.23 г.</a:t>
+              <a:t>2.7.2023 г.</a:t>
             </a:fld>
             <a:endParaRPr lang="bg-BG" dirty="0"/>
           </a:p>
@@ -496,7 +496,7 @@
           <a:p>
             <a:fld id="{72D84649-876A-46C9-8472-14CB09C070D8}" type="datetimeFigureOut">
               <a:rPr lang="en-US" smtClean="0"/>
-              <a:t>5/17/23</a:t>
+              <a:t>2-Jul-23</a:t>
             </a:fld>
             <a:endParaRPr lang="en-US" dirty="0"/>
           </a:p>
@@ -10324,7 +10324,12 @@
             <p:ph type="body" sz="quarter" idx="18"/>
           </p:nvPr>
         </p:nvSpPr>
-        <p:spPr/>
+        <p:spPr>
+          <a:xfrm>
+            <a:off x="8708505" y="6130863"/>
+            <a:ext cx="2951518" cy="341556"/>
+          </a:xfrm>
+        </p:spPr>
         <p:txBody>
           <a:bodyPr/>
           <a:lstStyle/>
@@ -10349,7 +10354,12 @@
             <p:ph type="body" sz="quarter" idx="17"/>
           </p:nvPr>
         </p:nvSpPr>
-        <p:spPr/>
+        <p:spPr>
+          <a:xfrm>
+            <a:off x="8708505" y="5756628"/>
+            <a:ext cx="2951518" cy="367080"/>
+          </a:xfrm>
+        </p:spPr>
         <p:txBody>
           <a:bodyPr/>
           <a:lstStyle/>
@@ -10373,25 +10383,18 @@
         </p:nvSpPr>
         <p:spPr>
           <a:xfrm>
-            <a:off x="0" y="5270641"/>
-            <a:ext cx="3187700" cy="444500"/>
+            <a:off x="553082" y="5344180"/>
+            <a:ext cx="2980696" cy="444793"/>
           </a:xfrm>
         </p:spPr>
         <p:txBody>
           <a:bodyPr>
-            <a:normAutofit fontScale="85000" lnSpcReduction="20000"/>
+            <a:normAutofit/>
           </a:bodyPr>
           <a:lstStyle/>
           <a:p>
-            <a:pPr marL="0" indent="0">
-              <a:buNone/>
-            </a:pPr>
-            <a:r>
-              <a:rPr lang="bg-BG" dirty="0"/>
-              <a:t>       </a:t>
-            </a:r>
-            <a:r>
-              <a:rPr lang="en-US" sz="3100" b="1" dirty="0"/>
+            <a:r>
+              <a:rPr lang="en-US" dirty="0"/>
               <a:t>Technical Trainers</a:t>
             </a:r>
           </a:p>
@@ -10409,25 +10412,18 @@
         </p:nvSpPr>
         <p:spPr>
           <a:xfrm>
-            <a:off x="0" y="4745178"/>
-            <a:ext cx="3465526" cy="525463"/>
+            <a:off x="553082" y="4851838"/>
+            <a:ext cx="2980696" cy="454398"/>
           </a:xfrm>
         </p:spPr>
         <p:txBody>
           <a:bodyPr>
-            <a:normAutofit/>
+            <a:normAutofit fontScale="92500" lnSpcReduction="10000"/>
           </a:bodyPr>
           <a:lstStyle/>
           <a:p>
-            <a:pPr marL="0" indent="0">
-              <a:buNone/>
-            </a:pPr>
-            <a:r>
-              <a:rPr lang="bg-BG" dirty="0"/>
-              <a:t>      </a:t>
-            </a:r>
-            <a:r>
-              <a:rPr lang="en-US" b="1" dirty="0"/>
+            <a:r>
+              <a:rPr lang="en-US" dirty="0"/>
               <a:t>SoftUni Team</a:t>
             </a:r>
           </a:p>
@@ -10445,8 +10441,8 @@
         </p:nvSpPr>
         <p:spPr>
           <a:xfrm>
-            <a:off x="2065254" y="1158163"/>
-            <a:ext cx="7294547" cy="882654"/>
+            <a:off x="554038" y="1376288"/>
+            <a:ext cx="11083925" cy="1422712"/>
           </a:xfrm>
         </p:spPr>
         <p:txBody>
@@ -10455,16 +10451,26 @@
           </a:bodyPr>
           <a:lstStyle/>
           <a:p>
-            <a:pPr>
-              <a:spcAft>
-                <a:spcPts val="0"/>
-              </a:spcAft>
-            </a:pPr>
             <a:r>
               <a:rPr lang="bg-BG" dirty="0"/>
-              <a:t>Ползи от енкапсулацията</a:t>
-            </a:r>
-            <a:endParaRPr lang="en-US" sz="3000" dirty="0"/>
+              <a:t>Ползи от капсулацията на данни в ООП,</a:t>
+            </a:r>
+            <a:br>
+              <a:rPr lang="bg-BG" dirty="0"/>
+            </a:br>
+            <a:r>
+              <a:rPr lang="bg-BG" dirty="0"/>
+              <a:t>скриване на детайлите в </a:t>
+            </a:r>
+            <a:r>
+              <a:rPr lang="en-US" dirty="0"/>
+              <a:t>private </a:t>
+            </a:r>
+            <a:r>
+              <a:rPr lang="bg-BG" dirty="0"/>
+              <a:t>полета и методи</a:t>
+            </a:r>
+            <a:endParaRPr lang="en-US" dirty="0"/>
           </a:p>
         </p:txBody>
       </p:sp>
@@ -10480,8 +10486,8 @@
         </p:nvSpPr>
         <p:spPr>
           <a:xfrm>
-            <a:off x="3162240" y="179602"/>
-            <a:ext cx="5100573" cy="882654"/>
+            <a:off x="554038" y="324000"/>
+            <a:ext cx="11083925" cy="970913"/>
           </a:xfrm>
         </p:spPr>
         <p:txBody>
@@ -10491,10 +10497,10 @@
           <a:lstStyle/>
           <a:p>
             <a:r>
-              <a:rPr lang="bg-BG" dirty="0"/>
-              <a:t>Енкапсулация</a:t>
-            </a:r>
-            <a:endParaRPr lang="en-US" dirty="0"/>
+              <a:rPr lang="bg-BG" sz="5400" dirty="0"/>
+              <a:t>Капсулация</a:t>
+            </a:r>
+            <a:endParaRPr lang="en-US" sz="4800" dirty="0"/>
           </a:p>
         </p:txBody>
       </p:sp>
@@ -10573,8 +10579,8 @@
         </p:blipFill>
         <p:spPr>
           <a:xfrm>
-            <a:off x="4611000" y="2214000"/>
-            <a:ext cx="1900365" cy="1900365"/>
+            <a:off x="4830981" y="2844000"/>
+            <a:ext cx="2090402" cy="2090402"/>
           </a:xfrm>
           <a:prstGeom prst="rect">
             <a:avLst/>
@@ -13302,12 +13308,9 @@
           <a:p>
             <a:r>
               <a:rPr lang="bg-BG" dirty="0"/>
-              <a:t>Какво представляват изключенията</a:t>
-            </a:r>
-            <a:r>
-              <a:rPr lang="en-US" dirty="0"/>
-              <a:t>?</a:t>
-            </a:r>
+              <a:t>Хвърляне и хващане на изключения</a:t>
+            </a:r>
+            <a:endParaRPr lang="en-US" dirty="0"/>
           </a:p>
         </p:txBody>
       </p:sp>
@@ -14112,7 +14115,15 @@
             </a:pPr>
             <a:r>
               <a:rPr lang="bg-BG" sz="3599" dirty="0"/>
-              <a:t>Изключения се хвърлят с ключовата дума </a:t>
+              <a:t>Изключения се </a:t>
+            </a:r>
+            <a:r>
+              <a:rPr lang="bg-BG" sz="3599" b="1" dirty="0"/>
+              <a:t>хвърлят</a:t>
+            </a:r>
+            <a:r>
+              <a:rPr lang="bg-BG" sz="3599" dirty="0"/>
+              <a:t> с ключовата дума </a:t>
             </a:r>
             <a:r>
               <a:rPr lang="en-US" sz="3599" b="1" dirty="0">
@@ -14137,7 +14148,15 @@
             </a:pPr>
             <a:r>
               <a:rPr lang="bg-BG" sz="3599" dirty="0"/>
-              <a:t>Когато е хвърлено изключение</a:t>
+              <a:t>Когато е </a:t>
+            </a:r>
+            <a:r>
+              <a:rPr lang="bg-BG" sz="3599" b="1" dirty="0"/>
+              <a:t>хвърлено</a:t>
+            </a:r>
+            <a:r>
+              <a:rPr lang="bg-BG" sz="3599" dirty="0"/>
+              <a:t> изключение</a:t>
             </a:r>
             <a:r>
               <a:rPr lang="en-US" sz="3599" dirty="0"/>
@@ -14155,7 +14174,7 @@
             </a:pPr>
             <a:r>
               <a:rPr lang="bg-BG" sz="3399" dirty="0"/>
-              <a:t>Изпълнението на програмата приключва</a:t>
+              <a:t>Изпълнението на програмата спира (временно)</a:t>
             </a:r>
             <a:endParaRPr lang="en-US" sz="3399" dirty="0"/>
           </a:p>
@@ -16271,6 +16290,44 @@
       </p:pic>
       <p:sp>
         <p:nvSpPr>
+          <p:cNvPr id="3" name="Subtitle 2">
+            <a:extLst>
+              <a:ext uri="{FF2B5EF4-FFF2-40B4-BE49-F238E27FC236}">
+                <a16:creationId xmlns:a16="http://schemas.microsoft.com/office/drawing/2014/main" id="{FE81687E-BEB0-D257-51AB-B99D4FA3572F}"/>
+              </a:ext>
+            </a:extLst>
+          </p:cNvPr>
+          <p:cNvSpPr>
+            <a:spLocks noGrp="1"/>
+          </p:cNvSpPr>
+          <p:nvPr>
+            <p:ph type="subTitle" sz="quarter" idx="11"/>
+          </p:nvPr>
+        </p:nvSpPr>
+        <p:spPr>
+          <a:xfrm>
+            <a:off x="615109" y="5675916"/>
+            <a:ext cx="10961783" cy="768084"/>
+          </a:xfrm>
+        </p:spPr>
+        <p:txBody>
+          <a:bodyPr/>
+          <a:lstStyle/>
+          <a:p>
+            <a:r>
+              <a:rPr lang="bg-BG" dirty="0"/>
+              <a:t>Пазене на коректно </a:t>
+            </a:r>
+            <a:r>
+              <a:rPr lang="bg-BG"/>
+              <a:t>вътрешно състояние</a:t>
+            </a:r>
+            <a:endParaRPr lang="en-US" dirty="0"/>
+          </a:p>
+        </p:txBody>
+      </p:sp>
+      <p:sp>
+        <p:nvSpPr>
           <p:cNvPr id="4" name="Title 3">
             <a:extLst>
               <a:ext uri="{FF2B5EF4-FFF2-40B4-BE49-F238E27FC236}">
@@ -16285,7 +16342,12 @@
             <p:ph type="title" sz="quarter" idx="10"/>
           </p:nvPr>
         </p:nvSpPr>
-        <p:spPr/>
+        <p:spPr>
+          <a:xfrm>
+            <a:off x="614363" y="4795350"/>
+            <a:ext cx="10963275" cy="768350"/>
+          </a:xfrm>
+        </p:spPr>
         <p:txBody>
           <a:bodyPr/>
           <a:lstStyle/>
@@ -16296,15 +16358,7 @@
             </a:r>
             <a:r>
               <a:rPr lang="en-GB" dirty="0"/>
-              <a:t>Getter</a:t>
-            </a:r>
-            <a:r>
-              <a:rPr lang="bg-BG" dirty="0"/>
-              <a:t>-и</a:t>
-            </a:r>
-            <a:r>
-              <a:rPr lang="en-GB" dirty="0"/>
-              <a:t> </a:t>
+              <a:t>getters </a:t>
             </a:r>
             <a:r>
               <a:rPr lang="bg-BG" dirty="0"/>
@@ -16312,11 +16366,7 @@
             </a:r>
             <a:r>
               <a:rPr lang="en-GB" dirty="0"/>
-              <a:t> Setter</a:t>
-            </a:r>
-            <a:r>
-              <a:rPr lang="bg-BG" dirty="0"/>
-              <a:t>-и</a:t>
+              <a:t> setters</a:t>
             </a:r>
             <a:endParaRPr lang="en-US" dirty="0"/>
           </a:p>
@@ -16372,27 +16422,29 @@
         </p:nvSpPr>
         <p:spPr>
           <a:xfrm>
-            <a:off x="190406" y="664617"/>
-            <a:ext cx="11818096" cy="5528766"/>
+            <a:off x="190406" y="1359000"/>
+            <a:ext cx="11818096" cy="5310000"/>
           </a:xfrm>
         </p:spPr>
         <p:txBody>
           <a:bodyPr/>
           <a:lstStyle/>
           <a:p>
-            <a:pPr marL="0" indent="0">
-              <a:buNone/>
-            </a:pPr>
-            <a:endParaRPr lang="bg-BG" sz="4000" dirty="0"/>
-          </a:p>
-          <a:p>
             <a:pPr marL="742950" indent="-742950">
               <a:buFont typeface="+mj-lt"/>
               <a:buAutoNum type="arabicPeriod"/>
             </a:pPr>
             <a:r>
               <a:rPr lang="bg-BG" sz="4000" dirty="0"/>
-              <a:t>Какво е енкапсулация</a:t>
+              <a:t>Какво е </a:t>
+            </a:r>
+            <a:r>
+              <a:rPr lang="bg-BG" sz="4000" b="1" dirty="0"/>
+              <a:t>капсулация</a:t>
+            </a:r>
+            <a:r>
+              <a:rPr lang="bg-BG" sz="4000" dirty="0"/>
+              <a:t> в ООП</a:t>
             </a:r>
             <a:r>
               <a:rPr lang="en-US" sz="4000" dirty="0"/>
@@ -16414,9 +16466,24 @@
             </a:r>
             <a:r>
               <a:rPr lang="bg-BG" sz="4000" dirty="0"/>
-              <a:t>за достъп</a:t>
-            </a:r>
-            <a:endParaRPr lang="en-US" sz="4000" dirty="0"/>
+              <a:t>за достъп: </a:t>
+            </a:r>
+            <a:r>
+              <a:rPr lang="en-US" sz="4000" b="1" dirty="0"/>
+              <a:t>public</a:t>
+            </a:r>
+            <a:r>
+              <a:rPr lang="en-US" sz="4000" dirty="0"/>
+              <a:t> </a:t>
+            </a:r>
+            <a:r>
+              <a:rPr lang="bg-BG" sz="4000" dirty="0"/>
+              <a:t>и </a:t>
+            </a:r>
+            <a:r>
+              <a:rPr lang="en-US" sz="4000" b="1" dirty="0"/>
+              <a:t>private</a:t>
+            </a:r>
           </a:p>
           <a:p>
             <a:pPr marL="742950" indent="-742950">
@@ -16424,8 +16491,16 @@
               <a:buAutoNum type="arabicPeriod"/>
             </a:pPr>
             <a:r>
+              <a:rPr lang="bg-BG" sz="4000" b="1" dirty="0"/>
+              <a:t>Изключения</a:t>
+            </a:r>
+            <a:r>
+              <a:rPr lang="en-US" sz="4000" dirty="0"/>
+              <a:t>, </a:t>
+            </a:r>
+            <a:r>
               <a:rPr lang="bg-BG" sz="4000" dirty="0"/>
-              <a:t>Изключения</a:t>
+              <a:t>хвърляне на изключения</a:t>
             </a:r>
           </a:p>
           <a:p>
@@ -16434,8 +16509,12 @@
               <a:buAutoNum type="arabicPeriod"/>
             </a:pPr>
             <a:r>
+              <a:rPr lang="bg-BG" sz="4000" b="1" dirty="0"/>
+              <a:t>Валидация</a:t>
+            </a:r>
+            <a:r>
               <a:rPr lang="bg-BG" sz="4000" dirty="0"/>
-              <a:t>Валидация</a:t>
+              <a:t> на данни в ООП</a:t>
             </a:r>
           </a:p>
         </p:txBody>
@@ -16558,7 +16637,7 @@
                                         <p:tgtEl>
                                           <p:spTgt spid="423939">
                                             <p:txEl>
-                                              <p:pRg st="2" end="2"/>
+                                              <p:pRg st="1" end="1"/>
                                             </p:txEl>
                                           </p:spTgt>
                                         </p:tgtEl>
@@ -16607,7 +16686,7 @@
                                         <p:tgtEl>
                                           <p:spTgt spid="423939">
                                             <p:txEl>
-                                              <p:pRg st="3" end="3"/>
+                                              <p:pRg st="2" end="2"/>
                                             </p:txEl>
                                           </p:spTgt>
                                         </p:tgtEl>
@@ -16656,7 +16735,7 @@
                                         <p:tgtEl>
                                           <p:spTgt spid="423939">
                                             <p:txEl>
-                                              <p:pRg st="4" end="4"/>
+                                              <p:pRg st="3" end="3"/>
                                             </p:txEl>
                                           </p:spTgt>
                                         </p:tgtEl>
@@ -17131,7 +17210,7 @@
                   </a:schemeClr>
                 </a:solidFill>
               </a:rPr>
-              <a:t>изключения (</a:t>
+              <a:t>изключени</a:t>
             </a:r>
             <a:r>
               <a:rPr lang="en-US" sz="2400" b="1" dirty="0">
@@ -17142,7 +17221,29 @@
                   </a:schemeClr>
                 </a:solidFill>
               </a:rPr>
-              <a:t>exceptions)</a:t>
+              <a:t>e</a:t>
+            </a:r>
+            <a:r>
+              <a:rPr lang="bg-BG" sz="2400" b="1" dirty="0">
+                <a:solidFill>
+                  <a:schemeClr val="bg1">
+                    <a:lumMod val="60000"/>
+                    <a:lumOff val="40000"/>
+                  </a:schemeClr>
+                </a:solidFill>
+              </a:rPr>
+              <a:t> (</a:t>
+            </a:r>
+            <a:r>
+              <a:rPr lang="en-US" sz="2400" b="1" dirty="0">
+                <a:solidFill>
+                  <a:schemeClr val="bg1">
+                    <a:lumMod val="60000"/>
+                    <a:lumOff val="40000"/>
+                  </a:schemeClr>
+                </a:solidFill>
+              </a:rPr>
+              <a:t>exception)</a:t>
             </a:r>
             <a:endParaRPr lang="en-US" sz="2400" b="1" noProof="1">
               <a:solidFill>
@@ -17704,8 +17805,8 @@
         </p:nvSpPr>
         <p:spPr bwMode="auto">
           <a:xfrm>
-            <a:off x="5376000" y="4104000"/>
-            <a:ext cx="3420000" cy="863969"/>
+            <a:off x="5466000" y="4014000"/>
+            <a:ext cx="3420000" cy="990000"/>
           </a:xfrm>
           <a:prstGeom prst="wedgeRoundRectCallout">
             <a:avLst>
@@ -19782,7 +19883,7 @@
           </p:nvSpPr>
           <p:spPr>
             <a:xfrm>
-              <a:off x="540767" y="1781251"/>
+              <a:off x="559707" y="1781251"/>
               <a:ext cx="85794" cy="4320631"/>
             </a:xfrm>
             <a:prstGeom prst="roundRect">
@@ -19842,7 +19943,7 @@
           </p:nvSpPr>
           <p:spPr>
             <a:xfrm rot="5400000">
-              <a:off x="3762569" y="1912372"/>
+              <a:off x="3743629" y="1912372"/>
               <a:ext cx="669775" cy="238503"/>
             </a:xfrm>
             <a:prstGeom prst="halfFrame">
@@ -19917,7 +20018,7 @@
         </p:blipFill>
         <p:spPr>
           <a:xfrm flipH="1">
-            <a:off x="8824937" y="3276641"/>
+            <a:off x="8983746" y="3297219"/>
             <a:ext cx="2882677" cy="3119781"/>
           </a:xfrm>
           <a:prstGeom prst="rect">
@@ -19941,8 +20042,8 @@
         </p:nvSpPr>
         <p:spPr>
           <a:xfrm>
-            <a:off x="543073" y="1723767"/>
-            <a:ext cx="11815018" cy="5201066"/>
+            <a:off x="650951" y="1809000"/>
+            <a:ext cx="7830049" cy="4608000"/>
           </a:xfrm>
           <a:prstGeom prst="rect">
             <a:avLst/>
@@ -20120,7 +20221,7 @@
             </a:lvl9pPr>
           </a:lstStyle>
           <a:p>
-            <a:pPr>
+            <a:pPr latinLnBrk="0">
               <a:lnSpc>
                 <a:spcPct val="100000"/>
               </a:lnSpc>
@@ -20129,12 +20230,23 @@
               </a:buClr>
             </a:pPr>
             <a:r>
+              <a:rPr lang="bg-BG" sz="3600" b="1" dirty="0">
+                <a:solidFill>
+                  <a:schemeClr val="bg1">
+                    <a:lumMod val="60000"/>
+                    <a:lumOff val="40000"/>
+                  </a:schemeClr>
+                </a:solidFill>
+              </a:rPr>
+              <a:t>Капсулация</a:t>
+            </a:r>
+            <a:r>
               <a:rPr lang="bg-BG" sz="3600" dirty="0">
                 <a:solidFill>
                   <a:schemeClr val="bg2"/>
                 </a:solidFill>
               </a:rPr>
-              <a:t>Енкапсулация</a:t>
+              <a:t> на данни</a:t>
             </a:r>
             <a:r>
               <a:rPr lang="en-US" sz="3600" dirty="0">
@@ -20146,7 +20258,7 @@
             </a:r>
           </a:p>
           <a:p>
-            <a:pPr lvl="1">
+            <a:pPr lvl="1" latinLnBrk="0">
               <a:lnSpc>
                 <a:spcPct val="100000"/>
               </a:lnSpc>
@@ -20191,7 +20303,7 @@
             </a:endParaRPr>
           </a:p>
           <a:p>
-            <a:pPr lvl="1">
+            <a:pPr lvl="1" latinLnBrk="0">
               <a:lnSpc>
                 <a:spcPct val="100000"/>
               </a:lnSpc>
@@ -20236,7 +20348,7 @@
             </a:endParaRPr>
           </a:p>
           <a:p>
-            <a:pPr lvl="1">
+            <a:pPr lvl="1" latinLnBrk="0">
               <a:lnSpc>
                 <a:spcPct val="100000"/>
               </a:lnSpc>
@@ -20250,31 +20362,11 @@
                   <a:schemeClr val="bg2"/>
                 </a:solidFill>
               </a:rPr>
-              <a:t>Гарантира, че структурните промени</a:t>
-            </a:r>
-            <a:br>
-              <a:rPr lang="en-US" sz="3400" dirty="0">
-                <a:solidFill>
-                  <a:schemeClr val="bg2"/>
-                </a:solidFill>
-              </a:rPr>
-            </a:br>
-            <a:r>
-              <a:rPr lang="bg-BG" sz="3400" dirty="0">
-                <a:solidFill>
-                  <a:schemeClr val="bg2"/>
-                </a:solidFill>
-              </a:rPr>
-              <a:t>остават локални</a:t>
-            </a:r>
-            <a:endParaRPr lang="en-US" sz="3400" dirty="0">
-              <a:solidFill>
-                <a:schemeClr val="bg2"/>
-              </a:solidFill>
-            </a:endParaRPr>
-          </a:p>
-          <a:p>
-            <a:pPr>
+              <a:t>Гарантира, че структурните промени остават локални</a:t>
+            </a:r>
+          </a:p>
+          <a:p>
+            <a:pPr lvl="1" latinLnBrk="0">
               <a:lnSpc>
                 <a:spcPct val="100000"/>
               </a:lnSpc>
@@ -20282,6 +20374,25 @@
                 <a:schemeClr val="bg2"/>
               </a:buClr>
             </a:pPr>
+            <a:r>
+              <a:rPr lang="bg-BG" sz="3400" dirty="0">
+                <a:solidFill>
+                  <a:schemeClr val="bg2"/>
+                </a:solidFill>
+              </a:rPr>
+              <a:t>Позволява контрол на вътрешното състояние на класа и </a:t>
+            </a:r>
+            <a:r>
+              <a:rPr lang="bg-BG" sz="3400" b="1" dirty="0">
+                <a:solidFill>
+                  <a:schemeClr val="bg1">
+                    <a:lumMod val="60000"/>
+                    <a:lumOff val="40000"/>
+                  </a:schemeClr>
+                </a:solidFill>
+              </a:rPr>
+              <a:t>валидация</a:t>
+            </a:r>
             <a:endParaRPr lang="en-US" sz="3600" dirty="0">
               <a:solidFill>
                 <a:schemeClr val="bg2"/>
@@ -20456,6 +20567,55 @@
                       </p:childTnLst>
                     </p:cTn>
                   </p:par>
+                  <p:par>
+                    <p:cTn id="11" fill="hold">
+                      <p:stCondLst>
+                        <p:cond delay="indefinite"/>
+                      </p:stCondLst>
+                      <p:childTnLst>
+                        <p:par>
+                          <p:cTn id="12" fill="hold">
+                            <p:stCondLst>
+                              <p:cond delay="0"/>
+                            </p:stCondLst>
+                            <p:childTnLst>
+                              <p:par>
+                                <p:cTn id="13" presetID="1" presetClass="entr" presetSubtype="0" fill="hold" nodeType="clickEffect">
+                                  <p:stCondLst>
+                                    <p:cond delay="0"/>
+                                  </p:stCondLst>
+                                  <p:childTnLst>
+                                    <p:set>
+                                      <p:cBhvr>
+                                        <p:cTn id="14" dur="1" fill="hold">
+                                          <p:stCondLst>
+                                            <p:cond delay="0"/>
+                                          </p:stCondLst>
+                                        </p:cTn>
+                                        <p:tgtEl>
+                                          <p:spTgt spid="15">
+                                            <p:txEl>
+                                              <p:pRg st="4" end="4"/>
+                                            </p:txEl>
+                                          </p:spTgt>
+                                        </p:tgtEl>
+                                        <p:attrNameLst>
+                                          <p:attrName>style.visibility</p:attrName>
+                                        </p:attrNameLst>
+                                      </p:cBhvr>
+                                      <p:to>
+                                        <p:strVal val="visible"/>
+                                      </p:to>
+                                    </p:set>
+                                  </p:childTnLst>
+                                </p:cTn>
+                              </p:par>
+                            </p:childTnLst>
+                          </p:cTn>
+                        </p:par>
+                      </p:childTnLst>
+                    </p:cTn>
+                  </p:par>
                 </p:childTnLst>
               </p:cTn>
               <p:prevCondLst>
@@ -20879,6 +21039,35 @@
       </p:grpSpPr>
       <p:sp>
         <p:nvSpPr>
+          <p:cNvPr id="3" name="Subtitle 2">
+            <a:extLst>
+              <a:ext uri="{FF2B5EF4-FFF2-40B4-BE49-F238E27FC236}">
+                <a16:creationId xmlns:a16="http://schemas.microsoft.com/office/drawing/2014/main" id="{99D148BC-8EFE-F46E-D102-2E5A3BC4CA68}"/>
+              </a:ext>
+            </a:extLst>
+          </p:cNvPr>
+          <p:cNvSpPr>
+            <a:spLocks noGrp="1"/>
+          </p:cNvSpPr>
+          <p:nvPr>
+            <p:ph type="subTitle" sz="quarter" idx="11"/>
+          </p:nvPr>
+        </p:nvSpPr>
+        <p:spPr/>
+        <p:txBody>
+          <a:bodyPr/>
+          <a:lstStyle/>
+          <a:p>
+            <a:r>
+              <a:rPr lang="bg-BG" dirty="0"/>
+              <a:t>Капсулация на данните – ООП принцип</a:t>
+            </a:r>
+            <a:endParaRPr lang="en-US" dirty="0"/>
+          </a:p>
+        </p:txBody>
+      </p:sp>
+      <p:sp>
+        <p:nvSpPr>
           <p:cNvPr id="5" name="Title 4">
             <a:extLst>
               <a:ext uri="{FF2B5EF4-FFF2-40B4-BE49-F238E27FC236}">
@@ -20893,7 +21082,12 @@
             <p:ph type="title" sz="quarter" idx="10"/>
           </p:nvPr>
         </p:nvSpPr>
-        <p:spPr/>
+        <p:spPr>
+          <a:xfrm>
+            <a:off x="615109" y="4704825"/>
+            <a:ext cx="10961783" cy="768084"/>
+          </a:xfrm>
+        </p:spPr>
         <p:txBody>
           <a:bodyPr/>
           <a:lstStyle/>
@@ -21011,7 +21205,15 @@
             </a:pPr>
             <a:r>
               <a:rPr lang="bg-BG" sz="3200" dirty="0"/>
-              <a:t>Процесът на обединяване на кода и данните в </a:t>
+              <a:t>Процесът на </a:t>
+            </a:r>
+            <a:r>
+              <a:rPr lang="bg-BG" sz="3200" b="1" dirty="0"/>
+              <a:t>обединяване на кода и данните </a:t>
+            </a:r>
+            <a:r>
+              <a:rPr lang="bg-BG" sz="3200" dirty="0"/>
+              <a:t>в </a:t>
             </a:r>
             <a:r>
               <a:rPr lang="bg-BG" sz="3200" b="1" dirty="0">
@@ -21033,6 +21235,98 @@
               </a:rPr>
               <a:t>цяло</a:t>
             </a:r>
+          </a:p>
+          <a:p>
+            <a:pPr lvl="1">
+              <a:lnSpc>
+                <a:spcPct val="100000"/>
+              </a:lnSpc>
+              <a:spcBef>
+                <a:spcPts val="400"/>
+              </a:spcBef>
+              <a:spcAft>
+                <a:spcPts val="400"/>
+              </a:spcAft>
+            </a:pPr>
+            <a:r>
+              <a:rPr lang="bg-BG" sz="3000" b="1" dirty="0">
+                <a:solidFill>
+                  <a:schemeClr val="bg1"/>
+                </a:solidFill>
+              </a:rPr>
+              <a:t>Скриване на детайлите </a:t>
+            </a:r>
+            <a:r>
+              <a:rPr lang="bg-BG" sz="3000" dirty="0"/>
+              <a:t>и показване на </a:t>
+            </a:r>
+            <a:r>
+              <a:rPr lang="bg-BG" sz="3000" b="1" dirty="0"/>
+              <a:t>публичен интерфейс</a:t>
+            </a:r>
+          </a:p>
+          <a:p>
+            <a:pPr lvl="1">
+              <a:lnSpc>
+                <a:spcPct val="100000"/>
+              </a:lnSpc>
+              <a:spcBef>
+                <a:spcPts val="400"/>
+              </a:spcBef>
+              <a:spcAft>
+                <a:spcPts val="400"/>
+              </a:spcAft>
+            </a:pPr>
+            <a:r>
+              <a:rPr lang="bg-BG" sz="3000" dirty="0"/>
+              <a:t>Позволява</a:t>
+            </a:r>
+            <a:r>
+              <a:rPr lang="en-US" sz="3000" dirty="0">
+                <a:solidFill>
+                  <a:schemeClr val="tx1">
+                    <a:lumMod val="40000"/>
+                    <a:lumOff val="60000"/>
+                  </a:schemeClr>
+                </a:solidFill>
+              </a:rPr>
+              <a:t> </a:t>
+            </a:r>
+            <a:r>
+              <a:rPr lang="bg-BG" sz="3000" b="1" dirty="0">
+                <a:solidFill>
+                  <a:schemeClr val="bg1"/>
+                </a:solidFill>
+              </a:rPr>
+              <a:t>валидация</a:t>
+            </a:r>
+            <a:r>
+              <a:rPr lang="en-US" sz="3000" dirty="0">
+                <a:solidFill>
+                  <a:schemeClr val="tx2">
+                    <a:lumMod val="75000"/>
+                  </a:schemeClr>
+                </a:solidFill>
+              </a:rPr>
+              <a:t> </a:t>
+            </a:r>
+            <a:r>
+              <a:rPr lang="bg-BG" sz="3000" b="1" dirty="0">
+                <a:solidFill>
+                  <a:schemeClr val="bg1"/>
+                </a:solidFill>
+              </a:rPr>
+              <a:t>на данните </a:t>
+            </a:r>
+            <a:r>
+              <a:rPr lang="bg-BG" sz="3000" dirty="0"/>
+              <a:t>и контрол над достъпа</a:t>
+            </a:r>
+            <a:endParaRPr lang="en-US" sz="3000" b="1" dirty="0">
+              <a:solidFill>
+                <a:schemeClr val="bg1"/>
+              </a:solidFill>
+            </a:endParaRPr>
           </a:p>
           <a:p>
             <a:pPr>
@@ -21046,66 +21340,7 @@
                 <a:spcPts val="400"/>
               </a:spcAft>
             </a:pPr>
-            <a:r>
-              <a:rPr lang="bg-BG" sz="3200" dirty="0"/>
-              <a:t>Позволява</a:t>
-            </a:r>
-            <a:r>
-              <a:rPr lang="en-US" sz="3200" dirty="0">
-                <a:solidFill>
-                  <a:schemeClr val="tx1">
-                    <a:lumMod val="40000"/>
-                    <a:lumOff val="60000"/>
-                  </a:schemeClr>
-                </a:solidFill>
-              </a:rPr>
-              <a:t> </a:t>
-            </a:r>
-            <a:r>
-              <a:rPr lang="bg-BG" sz="3200" b="1" dirty="0">
-                <a:solidFill>
-                  <a:schemeClr val="bg1"/>
-                </a:solidFill>
-              </a:rPr>
-              <a:t>валидация</a:t>
-            </a:r>
-            <a:r>
-              <a:rPr lang="en-US" sz="3200" dirty="0">
-                <a:solidFill>
-                  <a:schemeClr val="tx2">
-                    <a:lumMod val="75000"/>
-                  </a:schemeClr>
-                </a:solidFill>
-              </a:rPr>
-              <a:t> </a:t>
-            </a:r>
-            <a:r>
-              <a:rPr lang="bg-BG" sz="3200" dirty="0"/>
-              <a:t>и</a:t>
-            </a:r>
-            <a:r>
-              <a:rPr lang="en-US" sz="3200" dirty="0">
-                <a:solidFill>
-                  <a:schemeClr val="tx2">
-                    <a:lumMod val="75000"/>
-                  </a:schemeClr>
-                </a:solidFill>
-              </a:rPr>
-              <a:t> </a:t>
-            </a:r>
-            <a:r>
-              <a:rPr lang="bg-BG" sz="3200" b="1" dirty="0">
-                <a:solidFill>
-                  <a:schemeClr val="bg1"/>
-                </a:solidFill>
-              </a:rPr>
-              <a:t>обвързване на данните</a:t>
-            </a:r>
-            <a:endParaRPr lang="en-US" sz="3200" b="1" dirty="0">
-              <a:solidFill>
-                <a:schemeClr val="bg1"/>
-              </a:solidFill>
-            </a:endParaRPr>
+            <a:endParaRPr lang="bg-BG" sz="3200" dirty="0"/>
           </a:p>
           <a:p>
             <a:pPr>
@@ -21121,24 +21356,11 @@
             </a:pPr>
             <a:r>
               <a:rPr lang="bg-BG" sz="3200" dirty="0"/>
-              <a:t>Структурните промени остават</a:t>
-            </a:r>
-            <a:r>
-              <a:rPr lang="en-US" sz="3200" dirty="0"/>
-              <a:t> </a:t>
-            </a:r>
-            <a:r>
-              <a:rPr lang="bg-BG" sz="3200" b="1" dirty="0">
-                <a:solidFill>
-                  <a:schemeClr val="bg1"/>
-                </a:solidFill>
-              </a:rPr>
-              <a:t>локални</a:t>
-            </a:r>
-            <a:endParaRPr lang="en-US" sz="3200" dirty="0"/>
-          </a:p>
-          <a:p>
-            <a:pPr>
+              <a:t>Ползи:</a:t>
+            </a:r>
+          </a:p>
+          <a:p>
+            <a:pPr lvl="1">
               <a:lnSpc>
                 <a:spcPct val="100000"/>
               </a:lnSpc>
@@ -21150,34 +21372,58 @@
               </a:spcAft>
             </a:pPr>
             <a:r>
-              <a:rPr lang="bg-BG" sz="3200" dirty="0"/>
+              <a:rPr lang="bg-BG" sz="3000" dirty="0"/>
+              <a:t>Структурните промени</a:t>
+            </a:r>
+            <a:br>
+              <a:rPr lang="bg-BG" sz="3000" dirty="0"/>
+            </a:br>
+            <a:r>
+              <a:rPr lang="bg-BG" sz="3000" dirty="0"/>
+              <a:t>остават</a:t>
+            </a:r>
+            <a:r>
+              <a:rPr lang="en-US" sz="3000" dirty="0"/>
+              <a:t> </a:t>
+            </a:r>
+            <a:r>
+              <a:rPr lang="bg-BG" sz="3000" b="1" dirty="0">
+                <a:solidFill>
+                  <a:schemeClr val="bg1"/>
+                </a:solidFill>
+              </a:rPr>
+              <a:t>локални</a:t>
+            </a:r>
+            <a:endParaRPr lang="en-US" sz="3000" dirty="0"/>
+          </a:p>
+          <a:p>
+            <a:pPr lvl="1">
+              <a:lnSpc>
+                <a:spcPct val="100000"/>
+              </a:lnSpc>
+              <a:spcBef>
+                <a:spcPts val="400"/>
+              </a:spcBef>
+              <a:spcAft>
+                <a:spcPts val="400"/>
+              </a:spcAft>
+            </a:pPr>
+            <a:r>
+              <a:rPr lang="bg-BG" sz="3000" dirty="0"/>
               <a:t>Намалява</a:t>
             </a:r>
             <a:r>
-              <a:rPr lang="en-US" sz="3200" dirty="0"/>
+              <a:rPr lang="en-US" sz="3000" dirty="0"/>
               <a:t> </a:t>
             </a:r>
             <a:r>
-              <a:rPr lang="bg-BG" sz="3200" b="1" dirty="0">
+              <a:rPr lang="bg-BG" sz="3000" b="1" dirty="0">
                 <a:solidFill>
                   <a:schemeClr val="bg1"/>
                 </a:solidFill>
               </a:rPr>
               <a:t>комплексността</a:t>
             </a:r>
-            <a:endParaRPr lang="en-US" sz="3200" b="1" dirty="0">
-              <a:solidFill>
-                <a:schemeClr val="bg1"/>
-              </a:solidFill>
-            </a:endParaRPr>
-          </a:p>
-          <a:p>
-            <a:endParaRPr lang="bg-BG" sz="3200" dirty="0"/>
-          </a:p>
-          <a:p>
-            <a:endParaRPr lang="bg-BG" dirty="0"/>
-          </a:p>
-          <a:p>
             <a:endParaRPr lang="en-US" dirty="0"/>
           </a:p>
         </p:txBody>
@@ -21199,7 +21445,7 @@
           <a:p>
             <a:r>
               <a:rPr lang="bg-BG" dirty="0"/>
-              <a:t>Енкапсулация</a:t>
+              <a:t>Капсулация</a:t>
             </a:r>
           </a:p>
         </p:txBody>
@@ -21498,13 +21744,13 @@
         </p:nvSpPr>
         <p:spPr bwMode="auto">
           <a:xfrm>
-            <a:off x="2991000" y="4329000"/>
-            <a:ext cx="2887623" cy="1432611"/>
+            <a:off x="2811000" y="3013179"/>
+            <a:ext cx="2770183" cy="1054611"/>
           </a:xfrm>
           <a:prstGeom prst="wedgeRoundRectCallout">
             <a:avLst>
-              <a:gd name="adj1" fmla="val 71183"/>
-              <a:gd name="adj2" fmla="val -68676"/>
+              <a:gd name="adj1" fmla="val 74029"/>
+              <a:gd name="adj2" fmla="val 48348"/>
               <a:gd name="adj3" fmla="val 16667"/>
             </a:avLst>
           </a:prstGeom>
@@ -21582,7 +21828,7 @@
                   </a:schemeClr>
                 </a:solidFill>
               </a:rPr>
-              <a:t>публичните методи </a:t>
+              <a:t>методи </a:t>
             </a:r>
             <a:r>
               <a:rPr lang="bg-BG" sz="2400" b="1" noProof="1">
@@ -21843,7 +22089,7 @@
                                         <p:tgtEl>
                                           <p:spTgt spid="804867">
                                             <p:txEl>
-                                              <p:pRg st="1" end="1"/>
+                                              <p:pRg st="2" end="2"/>
                                             </p:txEl>
                                           </p:spTgt>
                                         </p:tgtEl>
@@ -21892,7 +22138,7 @@
                                         <p:tgtEl>
                                           <p:spTgt spid="804867">
                                             <p:txEl>
-                                              <p:pRg st="2" end="2"/>
+                                              <p:pRg st="4" end="4"/>
                                             </p:txEl>
                                           </p:spTgt>
                                         </p:tgtEl>
@@ -21941,7 +22187,7 @@
                                         <p:tgtEl>
                                           <p:spTgt spid="804867">
                                             <p:txEl>
-                                              <p:pRg st="3" end="3"/>
+                                              <p:pRg st="5" end="5"/>
                                             </p:txEl>
                                           </p:spTgt>
                                         </p:tgtEl>
@@ -21975,7 +22221,7 @@
                             </p:stCondLst>
                             <p:childTnLst>
                               <p:par>
-                                <p:cTn id="17" presetID="1" presetClass="entr" presetSubtype="0" fill="hold" grpId="0" nodeType="clickEffect">
+                                <p:cTn id="17" presetID="1" presetClass="entr" presetSubtype="0" fill="hold" nodeType="clickEffect">
                                   <p:stCondLst>
                                     <p:cond delay="0"/>
                                   </p:stCondLst>
@@ -21988,7 +22234,11 @@
                                           </p:stCondLst>
                                         </p:cTn>
                                         <p:tgtEl>
-                                          <p:spTgt spid="9"/>
+                                          <p:spTgt spid="804867">
+                                            <p:txEl>
+                                              <p:pRg st="6" end="6"/>
+                                            </p:txEl>
+                                          </p:spTgt>
                                         </p:tgtEl>
                                         <p:attrNameLst>
                                           <p:attrName>style.visibility</p:attrName>
@@ -22033,7 +22283,7 @@
                                           </p:stCondLst>
                                         </p:cTn>
                                         <p:tgtEl>
-                                          <p:spTgt spid="12"/>
+                                          <p:spTgt spid="9"/>
                                         </p:tgtEl>
                                         <p:attrNameLst>
                                           <p:attrName>style.visibility</p:attrName>
@@ -22073,6 +22323,51 @@
                                     <p:set>
                                       <p:cBhvr>
                                         <p:cTn id="26" dur="1" fill="hold">
+                                          <p:stCondLst>
+                                            <p:cond delay="0"/>
+                                          </p:stCondLst>
+                                        </p:cTn>
+                                        <p:tgtEl>
+                                          <p:spTgt spid="12"/>
+                                        </p:tgtEl>
+                                        <p:attrNameLst>
+                                          <p:attrName>style.visibility</p:attrName>
+                                        </p:attrNameLst>
+                                      </p:cBhvr>
+                                      <p:to>
+                                        <p:strVal val="visible"/>
+                                      </p:to>
+                                    </p:set>
+                                  </p:childTnLst>
+                                </p:cTn>
+                              </p:par>
+                            </p:childTnLst>
+                          </p:cTn>
+                        </p:par>
+                      </p:childTnLst>
+                    </p:cTn>
+                  </p:par>
+                  <p:par>
+                    <p:cTn id="27" fill="hold">
+                      <p:stCondLst>
+                        <p:cond delay="indefinite"/>
+                      </p:stCondLst>
+                      <p:childTnLst>
+                        <p:par>
+                          <p:cTn id="28" fill="hold">
+                            <p:stCondLst>
+                              <p:cond delay="0"/>
+                            </p:stCondLst>
+                            <p:childTnLst>
+                              <p:par>
+                                <p:cTn id="29" presetID="1" presetClass="entr" presetSubtype="0" fill="hold" grpId="0" nodeType="clickEffect">
+                                  <p:stCondLst>
+                                    <p:cond delay="0"/>
+                                  </p:stCondLst>
+                                  <p:childTnLst>
+                                    <p:set>
+                                      <p:cBhvr>
+                                        <p:cTn id="30" dur="1" fill="hold">
                                           <p:stCondLst>
                                             <p:cond delay="0"/>
                                           </p:stCondLst>
@@ -22248,7 +22543,7 @@
           <a:p>
             <a:r>
               <a:rPr lang="bg-BG" dirty="0"/>
-              <a:t>Пример: Енкапсулация</a:t>
+              <a:t>Пример: Капсулация</a:t>
             </a:r>
           </a:p>
         </p:txBody>
@@ -23341,6 +23636,46 @@
       </p:pic>
       <p:sp>
         <p:nvSpPr>
+          <p:cNvPr id="3" name="Subtitle 2">
+            <a:extLst>
+              <a:ext uri="{FF2B5EF4-FFF2-40B4-BE49-F238E27FC236}">
+                <a16:creationId xmlns:a16="http://schemas.microsoft.com/office/drawing/2014/main" id="{A1CD9F55-E363-DDC4-7C53-9386D00DF69C}"/>
+              </a:ext>
+            </a:extLst>
+          </p:cNvPr>
+          <p:cNvSpPr>
+            <a:spLocks noGrp="1"/>
+          </p:cNvSpPr>
+          <p:nvPr>
+            <p:ph type="subTitle" sz="quarter" idx="11"/>
+          </p:nvPr>
+        </p:nvSpPr>
+        <p:spPr/>
+        <p:txBody>
+          <a:bodyPr/>
+          <a:lstStyle/>
+          <a:p>
+            <a:r>
+              <a:rPr lang="bg-BG" dirty="0"/>
+              <a:t>Модификатори за достъп: </a:t>
+            </a:r>
+            <a:r>
+              <a:rPr lang="en-US" b="1" dirty="0"/>
+              <a:t>public</a:t>
+            </a:r>
+            <a:r>
+              <a:rPr lang="en-US" dirty="0"/>
+              <a:t>, </a:t>
+            </a:r>
+            <a:r>
+              <a:rPr lang="en-US" b="1" dirty="0"/>
+              <a:t>private</a:t>
+            </a:r>
+          </a:p>
+        </p:txBody>
+      </p:sp>
+      <p:sp>
+        <p:nvSpPr>
           <p:cNvPr id="5" name="Title 4">
             <a:extLst>
               <a:ext uri="{FF2B5EF4-FFF2-40B4-BE49-F238E27FC236}">
@@ -23355,7 +23690,12 @@
             <p:ph type="title" sz="quarter" idx="10"/>
           </p:nvPr>
         </p:nvSpPr>
-        <p:spPr/>
+        <p:spPr>
+          <a:xfrm>
+            <a:off x="615109" y="4704825"/>
+            <a:ext cx="10961783" cy="768084"/>
+          </a:xfrm>
+        </p:spPr>
         <p:txBody>
           <a:bodyPr/>
           <a:lstStyle/>
@@ -23438,7 +23778,7 @@
                   <a:schemeClr val="bg1"/>
                 </a:solidFill>
               </a:rPr>
-              <a:t>енкапсулация</a:t>
+              <a:t>капсулация</a:t>
             </a:r>
             <a:r>
               <a:rPr lang="bg-BG" sz="2800" dirty="0"/>

</xml_diff>

<commit_message>
Fixes and material restructure
</commit_message>
<xml_diff>
--- a/Courses/Software-Sciences/Module-1-OOP/08.1-Encapsulation-Basics/08.1-Encapsulation-Basics.pptx
+++ b/Courses/Software-Sciences/Module-1-OOP/08.1-Encapsulation-Basics/08.1-Encapsulation-Basics.pptx
@@ -311,7 +311,7 @@
           <a:p>
             <a:fld id="{4E087215-0C8F-4762-A664-737A353EC9A4}" type="datetimeFigureOut">
               <a:rPr lang="bg-BG" smtClean="0"/>
-              <a:t>15.06.24 г.</a:t>
+              <a:t>17.06.24 г.</a:t>
             </a:fld>
             <a:endParaRPr lang="bg-BG"/>
           </a:p>
@@ -507,7 +507,7 @@
           <a:p>
             <a:fld id="{72D84649-876A-46C9-8472-14CB09C070D8}" type="datetimeFigureOut">
               <a:rPr lang="en-US" smtClean="0"/>
-              <a:t>6/15/24</a:t>
+              <a:t>6/17/24</a:t>
             </a:fld>
             <a:endParaRPr lang="en-US"/>
           </a:p>
@@ -9732,6 +9732,9 @@
           </a:p>
           <a:p>
             <a:pPr>
+              <a:spcBef>
+                <a:spcPts val="0"/>
+              </a:spcBef>
               <a:buClr>
                 <a:schemeClr val="tx1"/>
               </a:buClr>
@@ -9800,8 +9803,8 @@
         </p:nvSpPr>
         <p:spPr bwMode="auto">
           <a:xfrm>
-            <a:off x="696000" y="1860331"/>
-            <a:ext cx="7695000" cy="2628969"/>
+            <a:off x="696000" y="1932732"/>
+            <a:ext cx="7695000" cy="2126268"/>
           </a:xfrm>
           <a:prstGeom prst="rect">
             <a:avLst/>
@@ -9841,7 +9844,7 @@
                 <a:latin typeface="Consolas" pitchFamily="49" charset="0"/>
                 <a:cs typeface="Consolas" pitchFamily="49" charset="0"/>
               </a:rPr>
-              <a:t>internal class Person </a:t>
+              <a:t>internal class Team </a:t>
             </a:r>
           </a:p>
           <a:p>
@@ -9898,25 +9901,6 @@
                 <a:latin typeface="Consolas" pitchFamily="49" charset="0"/>
                 <a:cs typeface="Consolas" pitchFamily="49" charset="0"/>
               </a:rPr>
-              <a:t>   public int Age { get; set; }</a:t>
-            </a:r>
-          </a:p>
-          <a:p>
-            <a:pPr defTabSz="1218438" latinLnBrk="1">
-              <a:spcBef>
-                <a:spcPts val="400"/>
-              </a:spcBef>
-              <a:spcAft>
-                <a:spcPts val="400"/>
-              </a:spcAft>
-              <a:buFont typeface="Wingdings" panose="05000000000000000000" pitchFamily="2" charset="2"/>
-              <a:buNone/>
-            </a:pPr>
-            <a:r>
-              <a:rPr lang="en-US" sz="2600" b="1" noProof="1">
-                <a:latin typeface="Consolas" pitchFamily="49" charset="0"/>
-                <a:cs typeface="Consolas" pitchFamily="49" charset="0"/>
-              </a:rPr>
               <a:t>}</a:t>
             </a:r>
           </a:p>
@@ -9932,7 +9916,7 @@
         </p:nvSpPr>
         <p:spPr bwMode="auto">
           <a:xfrm>
-            <a:off x="696000" y="5229000"/>
+            <a:off x="696000" y="5184000"/>
             <a:ext cx="6613592" cy="1172160"/>
           </a:xfrm>
           <a:prstGeom prst="rect">
@@ -9973,7 +9957,7 @@
                 <a:latin typeface="Consolas" pitchFamily="49" charset="0"/>
                 <a:cs typeface="Consolas" pitchFamily="49" charset="0"/>
               </a:rPr>
-              <a:t>Team rm = new Team("Real");</a:t>
+              <a:t>Team rm = new Team();</a:t>
             </a:r>
           </a:p>
           <a:p>
@@ -16437,7 +16421,7 @@
         <p:spPr bwMode="auto">
           <a:xfrm>
             <a:off x="1102301" y="1328182"/>
-            <a:ext cx="9987398" cy="5294987"/>
+            <a:ext cx="9987398" cy="4955960"/>
           </a:xfrm>
           <a:prstGeom prst="rect">
             <a:avLst/>
@@ -16762,23 +16746,6 @@
                 <a:cs typeface="Consolas" pitchFamily="49" charset="0"/>
               </a:rPr>
               <a:t>Console.Error.WriteLine("Error: " + ex.Message);</a:t>
-            </a:r>
-          </a:p>
-          <a:p>
-            <a:pPr indent="-456641" defTabSz="1218072" latinLnBrk="1"/>
-            <a:r>
-              <a:rPr lang="en-US" sz="2199" b="1" noProof="1">
-                <a:latin typeface="Consolas" pitchFamily="49" charset="0"/>
-                <a:cs typeface="Consolas" pitchFamily="49" charset="0"/>
-              </a:rPr>
-              <a:t>    </a:t>
-            </a:r>
-            <a:r>
-              <a:rPr lang="bg-BG" sz="2199" b="1" noProof="1">
-                <a:latin typeface="Consolas" pitchFamily="49" charset="0"/>
-                <a:cs typeface="Consolas" pitchFamily="49" charset="0"/>
-              </a:rPr>
-              <a:t>throw;</a:t>
             </a:r>
           </a:p>
           <a:p>
@@ -16937,7 +16904,7 @@
                                         <p:tgtEl>
                                           <p:spTgt spid="566275">
                                             <p:txEl>
-                                              <p:pRg st="14" end="14"/>
+                                              <p:pRg st="13" end="13"/>
                                             </p:txEl>
                                           </p:spTgt>
                                         </p:tgtEl>
@@ -17079,7 +17046,7 @@
                                         <p:tgtEl>
                                           <p:spTgt spid="566275">
                                             <p:txEl>
-                                              <p:pRg st="13" end="13"/>
+                                              <p:pRg st="12" end="12"/>
                                             </p:txEl>
                                           </p:spTgt>
                                         </p:tgtEl>
@@ -17178,37 +17145,6 @@
                                           <p:spTgt spid="566275">
                                             <p:txEl>
                                               <p:pRg st="11" end="11"/>
-                                            </p:txEl>
-                                          </p:spTgt>
-                                        </p:tgtEl>
-                                        <p:attrNameLst>
-                                          <p:attrName>style.visibility</p:attrName>
-                                        </p:attrNameLst>
-                                      </p:cBhvr>
-                                      <p:to>
-                                        <p:strVal val="visible"/>
-                                      </p:to>
-                                    </p:set>
-                                  </p:childTnLst>
-                                </p:cTn>
-                              </p:par>
-                              <p:par>
-                                <p:cTn id="27" presetID="1" presetClass="entr" presetSubtype="0" fill="hold" nodeType="withEffect">
-                                  <p:stCondLst>
-                                    <p:cond delay="0"/>
-                                  </p:stCondLst>
-                                  <p:childTnLst>
-                                    <p:set>
-                                      <p:cBhvr>
-                                        <p:cTn id="28" dur="1" fill="hold">
-                                          <p:stCondLst>
-                                            <p:cond delay="0"/>
-                                          </p:stCondLst>
-                                        </p:cTn>
-                                        <p:tgtEl>
-                                          <p:spTgt spid="566275">
-                                            <p:txEl>
-                                              <p:pRg st="12" end="12"/>
                                             </p:txEl>
                                           </p:spTgt>
                                         </p:tgtEl>
@@ -22073,7 +22009,23 @@
             </a:r>
             <a:r>
               <a:rPr lang="bg-BG" sz="3000" b="1" dirty="0"/>
-              <a:t>обединяване на кода и данните </a:t>
+              <a:t>обединяване </a:t>
+            </a:r>
+            <a:r>
+              <a:rPr lang="bg-BG" sz="3000" dirty="0"/>
+              <a:t>на</a:t>
+            </a:r>
+            <a:r>
+              <a:rPr lang="bg-BG" sz="3000" b="1" dirty="0"/>
+              <a:t> данните </a:t>
+            </a:r>
+            <a:r>
+              <a:rPr lang="bg-BG" sz="3000" dirty="0"/>
+              <a:t>и </a:t>
+            </a:r>
+            <a:r>
+              <a:rPr lang="bg-BG" sz="3000" b="1" dirty="0"/>
+              <a:t>методите </a:t>
             </a:r>
             <a:r>
               <a:rPr lang="bg-BG" sz="3000" dirty="0"/>
@@ -22121,7 +22073,7 @@
                   <a:schemeClr val="bg1"/>
                 </a:solidFill>
               </a:rPr>
-              <a:t>Скрива на детайлите </a:t>
+              <a:t>Скриване на детайлите </a:t>
             </a:r>
             <a:r>
               <a:rPr lang="bg-BG" sz="2800" dirty="0"/>

</xml_diff>